<commit_message>
The bug is fixed and can do the further things
</commit_message>
<xml_diff>
--- a/examples/demo_PPT/output_demo.pptx
+++ b/examples/demo_PPT/output_demo.pptx
@@ -7,7 +7,6 @@
   <p:sldIdLst>
     <p:sldId id="256" r:id="rId7"/>
     <p:sldId id="257" r:id="rId8"/>
-    <p:sldId id="258" r:id="rId9"/>
   </p:sldIdLst>
   <p:sldSz cx="9144000" cy="6858000" type="screen4x3"/>
   <p:notesSz cx="6858000" cy="9144000"/>
@@ -3106,7 +3105,7 @@
           <a:lstStyle/>
           <a:p>
             <a:r>
-              <a:t>Sheet1</a:t>
+              <a:t>Full portfoilio Allocation</a:t>
             </a:r>
           </a:p>
         </p:txBody>
@@ -3130,23 +3129,12 @@
                 <a:tableStyleId>{5C22544A-7EE6-4342-B048-85BDC9FD1C3A}</a:tableStyleId>
               </a:tblPr>
               <a:tblGrid>
-                <a:gridCol w="8229600"/>
+                <a:gridCol w="2057400"/>
+                <a:gridCol w="2057400"/>
+                <a:gridCol w="2057400"/>
+                <a:gridCol w="2057400"/>
               </a:tblGrid>
-              <a:tr h="522514">
-                <a:tc>
-                  <a:txBody>
-                    <a:bodyPr/>
-                    <a:lstStyle/>
-                    <a:p>
-                      <a:r>
-                        <a:t>2. Portfolio Allocation Data</a:t>
-                      </a:r>
-                    </a:p>
-                  </a:txBody>
-                  <a:tcPr/>
-                </a:tc>
-              </a:tr>
-              <a:tr h="522514">
+              <a:tr h="609600">
                 <a:tc>
                   <a:txBody>
                     <a:bodyPr/>
@@ -3159,8 +3147,44 @@
                   </a:txBody>
                   <a:tcPr/>
                 </a:tc>
+                <a:tc>
+                  <a:txBody>
+                    <a:bodyPr/>
+                    <a:lstStyle/>
+                    <a:p>
+                      <a:r>
+                        <a:t>Sector</a:t>
+                      </a:r>
+                    </a:p>
+                  </a:txBody>
+                  <a:tcPr/>
+                </a:tc>
+                <a:tc>
+                  <a:txBody>
+                    <a:bodyPr/>
+                    <a:lstStyle/>
+                    <a:p>
+                      <a:r>
+                        <a:t>Country</a:t>
+                      </a:r>
+                    </a:p>
+                  </a:txBody>
+                  <a:tcPr/>
+                </a:tc>
+                <a:tc>
+                  <a:txBody>
+                    <a:bodyPr/>
+                    <a:lstStyle/>
+                    <a:p>
+                      <a:r>
+                        <a:t>Value</a:t>
+                      </a:r>
+                    </a:p>
+                  </a:txBody>
+                  <a:tcPr/>
+                </a:tc>
               </a:tr>
-              <a:tr h="522514">
+              <a:tr h="609600">
                 <a:tc>
                   <a:txBody>
                     <a:bodyPr/>
@@ -3173,8 +3197,44 @@
                   </a:txBody>
                   <a:tcPr/>
                 </a:tc>
+                <a:tc>
+                  <a:txBody>
+                    <a:bodyPr/>
+                    <a:lstStyle/>
+                    <a:p>
+                      <a:r>
+                        <a:t>Tech</a:t>
+                      </a:r>
+                    </a:p>
+                  </a:txBody>
+                  <a:tcPr/>
+                </a:tc>
+                <a:tc>
+                  <a:txBody>
+                    <a:bodyPr/>
+                    <a:lstStyle/>
+                    <a:p>
+                      <a:r>
+                        <a:t>USA</a:t>
+                      </a:r>
+                    </a:p>
+                  </a:txBody>
+                  <a:tcPr/>
+                </a:tc>
+                <a:tc>
+                  <a:txBody>
+                    <a:bodyPr/>
+                    <a:lstStyle/>
+                    <a:p>
+                      <a:r>
+                        <a:t>20000</a:t>
+                      </a:r>
+                    </a:p>
+                  </a:txBody>
+                  <a:tcPr/>
+                </a:tc>
               </a:tr>
-              <a:tr h="522514">
+              <a:tr h="609600">
                 <a:tc>
                   <a:txBody>
                     <a:bodyPr/>
@@ -3187,8 +3247,44 @@
                   </a:txBody>
                   <a:tcPr/>
                 </a:tc>
+                <a:tc>
+                  <a:txBody>
+                    <a:bodyPr/>
+                    <a:lstStyle/>
+                    <a:p>
+                      <a:r>
+                        <a:t>Auto</a:t>
+                      </a:r>
+                    </a:p>
+                  </a:txBody>
+                  <a:tcPr/>
+                </a:tc>
+                <a:tc>
+                  <a:txBody>
+                    <a:bodyPr/>
+                    <a:lstStyle/>
+                    <a:p>
+                      <a:r>
+                        <a:t>USA</a:t>
+                      </a:r>
+                    </a:p>
+                  </a:txBody>
+                  <a:tcPr/>
+                </a:tc>
+                <a:tc>
+                  <a:txBody>
+                    <a:bodyPr/>
+                    <a:lstStyle/>
+                    <a:p>
+                      <a:r>
+                        <a:t>15000</a:t>
+                      </a:r>
+                    </a:p>
+                  </a:txBody>
+                  <a:tcPr/>
+                </a:tc>
               </a:tr>
-              <a:tr h="522514">
+              <a:tr h="609600">
                 <a:tc>
                   <a:txBody>
                     <a:bodyPr/>
@@ -3201,8 +3297,44 @@
                   </a:txBody>
                   <a:tcPr/>
                 </a:tc>
+                <a:tc>
+                  <a:txBody>
+                    <a:bodyPr/>
+                    <a:lstStyle/>
+                    <a:p>
+                      <a:r>
+                        <a:t>IT</a:t>
+                      </a:r>
+                    </a:p>
+                  </a:txBody>
+                  <a:tcPr/>
+                </a:tc>
+                <a:tc>
+                  <a:txBody>
+                    <a:bodyPr/>
+                    <a:lstStyle/>
+                    <a:p>
+                      <a:r>
+                        <a:t>India</a:t>
+                      </a:r>
+                    </a:p>
+                  </a:txBody>
+                  <a:tcPr/>
+                </a:tc>
+                <a:tc>
+                  <a:txBody>
+                    <a:bodyPr/>
+                    <a:lstStyle/>
+                    <a:p>
+                      <a:r>
+                        <a:t>10000</a:t>
+                      </a:r>
+                    </a:p>
+                  </a:txBody>
+                  <a:tcPr/>
+                </a:tc>
               </a:tr>
-              <a:tr h="522514">
+              <a:tr h="609600">
                 <a:tc>
                   <a:txBody>
                     <a:bodyPr/>
@@ -3215,8 +3347,44 @@
                   </a:txBody>
                   <a:tcPr/>
                 </a:tc>
+                <a:tc>
+                  <a:txBody>
+                    <a:bodyPr/>
+                    <a:lstStyle/>
+                    <a:p>
+                      <a:r>
+                        <a:t>Crypto</a:t>
+                      </a:r>
+                    </a:p>
+                  </a:txBody>
+                  <a:tcPr/>
+                </a:tc>
+                <a:tc>
+                  <a:txBody>
+                    <a:bodyPr/>
+                    <a:lstStyle/>
+                    <a:p>
+                      <a:r>
+                        <a:t>Global</a:t>
+                      </a:r>
+                    </a:p>
+                  </a:txBody>
+                  <a:tcPr/>
+                </a:tc>
+                <a:tc>
+                  <a:txBody>
+                    <a:bodyPr/>
+                    <a:lstStyle/>
+                    <a:p>
+                      <a:r>
+                        <a:t>8000</a:t>
+                      </a:r>
+                    </a:p>
+                  </a:txBody>
+                  <a:tcPr/>
+                </a:tc>
               </a:tr>
-              <a:tr h="522516">
+              <a:tr h="609600">
                 <a:tc>
                   <a:txBody>
                     <a:bodyPr/>
@@ -3224,6 +3392,42 @@
                     <a:p>
                       <a:r>
                         <a:t>ETH-USD</a:t>
+                      </a:r>
+                    </a:p>
+                  </a:txBody>
+                  <a:tcPr/>
+                </a:tc>
+                <a:tc>
+                  <a:txBody>
+                    <a:bodyPr/>
+                    <a:lstStyle/>
+                    <a:p>
+                      <a:r>
+                        <a:t>Crypto</a:t>
+                      </a:r>
+                    </a:p>
+                  </a:txBody>
+                  <a:tcPr/>
+                </a:tc>
+                <a:tc>
+                  <a:txBody>
+                    <a:bodyPr/>
+                    <a:lstStyle/>
+                    <a:p>
+                      <a:r>
+                        <a:t>Global</a:t>
+                      </a:r>
+                    </a:p>
+                  </a:txBody>
+                  <a:tcPr/>
+                </a:tc>
+                <a:tc>
+                  <a:txBody>
+                    <a:bodyPr/>
+                    <a:lstStyle/>
+                    <a:p>
+                      <a:r>
+                        <a:t>5000</a:t>
                       </a:r>
                     </a:p>
                   </a:txBody>
@@ -3268,7 +3472,7 @@
           <a:lstStyle/>
           <a:p>
             <a:r>
-              <a:t>Full portfoilio Allocation</a:t>
+              <a:t> Top 3 Portfoilio Assests</a:t>
             </a:r>
           </a:p>
         </p:txBody>
@@ -3292,23 +3496,12 @@
                 <a:tableStyleId>{5C22544A-7EE6-4342-B048-85BDC9FD1C3A}</a:tableStyleId>
               </a:tblPr>
               <a:tblGrid>
-                <a:gridCol w="8229600"/>
+                <a:gridCol w="2057400"/>
+                <a:gridCol w="2057400"/>
+                <a:gridCol w="2057400"/>
+                <a:gridCol w="2057400"/>
               </a:tblGrid>
-              <a:tr h="522514">
-                <a:tc>
-                  <a:txBody>
-                    <a:bodyPr/>
-                    <a:lstStyle/>
-                    <a:p>
-                      <a:r>
-                        <a:t>2. Portfolio Allocation Data</a:t>
-                      </a:r>
-                    </a:p>
-                  </a:txBody>
-                  <a:tcPr/>
-                </a:tc>
-              </a:tr>
-              <a:tr h="522514">
+              <a:tr h="914400">
                 <a:tc>
                   <a:txBody>
                     <a:bodyPr/>
@@ -3321,163 +3514,37 @@
                   </a:txBody>
                   <a:tcPr/>
                 </a:tc>
-              </a:tr>
-              <a:tr h="522514">
                 <a:tc>
                   <a:txBody>
                     <a:bodyPr/>
                     <a:lstStyle/>
                     <a:p>
                       <a:r>
-                        <a:t>AAPL</a:t>
+                        <a:t>Sector</a:t>
                       </a:r>
                     </a:p>
                   </a:txBody>
                   <a:tcPr/>
                 </a:tc>
-              </a:tr>
-              <a:tr h="522514">
                 <a:tc>
                   <a:txBody>
                     <a:bodyPr/>
                     <a:lstStyle/>
                     <a:p>
                       <a:r>
-                        <a:t>TSLA</a:t>
+                        <a:t>Country</a:t>
                       </a:r>
                     </a:p>
                   </a:txBody>
                   <a:tcPr/>
                 </a:tc>
-              </a:tr>
-              <a:tr h="522514">
                 <a:tc>
                   <a:txBody>
                     <a:bodyPr/>
                     <a:lstStyle/>
                     <a:p>
                       <a:r>
-                        <a:t>TCS.NS</a:t>
-                      </a:r>
-                    </a:p>
-                  </a:txBody>
-                  <a:tcPr/>
-                </a:tc>
-              </a:tr>
-              <a:tr h="522514">
-                <a:tc>
-                  <a:txBody>
-                    <a:bodyPr/>
-                    <a:lstStyle/>
-                    <a:p>
-                      <a:r>
-                        <a:t>BTC-USD</a:t>
-                      </a:r>
-                    </a:p>
-                  </a:txBody>
-                  <a:tcPr/>
-                </a:tc>
-              </a:tr>
-              <a:tr h="522516">
-                <a:tc>
-                  <a:txBody>
-                    <a:bodyPr/>
-                    <a:lstStyle/>
-                    <a:p>
-                      <a:r>
-                        <a:t>ETH-USD</a:t>
-                      </a:r>
-                    </a:p>
-                  </a:txBody>
-                  <a:tcPr/>
-                </a:tc>
-              </a:tr>
-            </a:tbl>
-          </a:graphicData>
-        </a:graphic>
-      </p:graphicFrame>
-    </p:spTree>
-  </p:cSld>
-  <p:clrMapOvr>
-    <a:masterClrMapping/>
-  </p:clrMapOvr>
-</p:sld>
-</file>
-
-<file path=ppt/slides/slide3.xml><?xml version="1.0" encoding="utf-8"?>
-<p:sld xmlns:a="http://schemas.openxmlformats.org/drawingml/2006/main" xmlns:p="http://schemas.openxmlformats.org/presentationml/2006/main" xmlns:r="http://schemas.openxmlformats.org/officeDocument/2006/relationships">
-  <p:cSld>
-    <p:spTree>
-      <p:nvGrpSpPr>
-        <p:cNvPr id="1" name=""/>
-        <p:cNvGrpSpPr/>
-        <p:nvPr/>
-      </p:nvGrpSpPr>
-      <p:grpSpPr/>
-      <p:sp>
-        <p:nvSpPr>
-          <p:cNvPr id="2" name="Title 1"/>
-          <p:cNvSpPr>
-            <a:spLocks noGrp="1"/>
-          </p:cNvSpPr>
-          <p:nvPr>
-            <p:ph type="title"/>
-          </p:nvPr>
-        </p:nvSpPr>
-        <p:spPr/>
-        <p:txBody>
-          <a:bodyPr/>
-          <a:lstStyle/>
-          <a:p>
-            <a:r>
-              <a:t> Top 3 Portfoilio Assests</a:t>
-            </a:r>
-          </a:p>
-        </p:txBody>
-      </p:sp>
-      <p:graphicFrame>
-        <p:nvGraphicFramePr>
-          <p:cNvPr id="3" name="Table 2"/>
-          <p:cNvGraphicFramePr>
-            <a:graphicFrameLocks noGrp="1"/>
-          </p:cNvGraphicFramePr>
-          <p:nvPr/>
-        </p:nvGraphicFramePr>
-        <p:xfrm>
-          <a:off x="457200" y="1371600"/>
-          <a:ext cx="8229600" cy="3657600"/>
-        </p:xfrm>
-        <a:graphic>
-          <a:graphicData uri="http://schemas.openxmlformats.org/drawingml/2006/table">
-            <a:tbl>
-              <a:tblPr firstRow="1" bandRow="1">
-                <a:tableStyleId>{5C22544A-7EE6-4342-B048-85BDC9FD1C3A}</a:tableStyleId>
-              </a:tblPr>
-              <a:tblGrid>
-                <a:gridCol w="8229600"/>
-              </a:tblGrid>
-              <a:tr h="914400">
-                <a:tc>
-                  <a:txBody>
-                    <a:bodyPr/>
-                    <a:lstStyle/>
-                    <a:p>
-                      <a:r>
-                        <a:t>2. Portfolio Allocation Data</a:t>
-                      </a:r>
-                    </a:p>
-                  </a:txBody>
-                  <a:tcPr/>
-                </a:tc>
-              </a:tr>
-              <a:tr h="914400">
-                <a:tc>
-                  <a:txBody>
-                    <a:bodyPr/>
-                    <a:lstStyle/>
-                    <a:p>
-                      <a:r>
-                        <a:t>Asset</a:t>
+                        <a:t>Value</a:t>
                       </a:r>
                     </a:p>
                   </a:txBody>
@@ -3497,6 +3564,42 @@
                   </a:txBody>
                   <a:tcPr/>
                 </a:tc>
+                <a:tc>
+                  <a:txBody>
+                    <a:bodyPr/>
+                    <a:lstStyle/>
+                    <a:p>
+                      <a:r>
+                        <a:t>Tech</a:t>
+                      </a:r>
+                    </a:p>
+                  </a:txBody>
+                  <a:tcPr/>
+                </a:tc>
+                <a:tc>
+                  <a:txBody>
+                    <a:bodyPr/>
+                    <a:lstStyle/>
+                    <a:p>
+                      <a:r>
+                        <a:t>USA</a:t>
+                      </a:r>
+                    </a:p>
+                  </a:txBody>
+                  <a:tcPr/>
+                </a:tc>
+                <a:tc>
+                  <a:txBody>
+                    <a:bodyPr/>
+                    <a:lstStyle/>
+                    <a:p>
+                      <a:r>
+                        <a:t>20000</a:t>
+                      </a:r>
+                    </a:p>
+                  </a:txBody>
+                  <a:tcPr/>
+                </a:tc>
               </a:tr>
               <a:tr h="914400">
                 <a:tc>
@@ -3506,6 +3609,92 @@
                     <a:p>
                       <a:r>
                         <a:t>TSLA</a:t>
+                      </a:r>
+                    </a:p>
+                  </a:txBody>
+                  <a:tcPr/>
+                </a:tc>
+                <a:tc>
+                  <a:txBody>
+                    <a:bodyPr/>
+                    <a:lstStyle/>
+                    <a:p>
+                      <a:r>
+                        <a:t>Auto</a:t>
+                      </a:r>
+                    </a:p>
+                  </a:txBody>
+                  <a:tcPr/>
+                </a:tc>
+                <a:tc>
+                  <a:txBody>
+                    <a:bodyPr/>
+                    <a:lstStyle/>
+                    <a:p>
+                      <a:r>
+                        <a:t>USA</a:t>
+                      </a:r>
+                    </a:p>
+                  </a:txBody>
+                  <a:tcPr/>
+                </a:tc>
+                <a:tc>
+                  <a:txBody>
+                    <a:bodyPr/>
+                    <a:lstStyle/>
+                    <a:p>
+                      <a:r>
+                        <a:t>15000</a:t>
+                      </a:r>
+                    </a:p>
+                  </a:txBody>
+                  <a:tcPr/>
+                </a:tc>
+              </a:tr>
+              <a:tr h="914400">
+                <a:tc>
+                  <a:txBody>
+                    <a:bodyPr/>
+                    <a:lstStyle/>
+                    <a:p>
+                      <a:r>
+                        <a:t>TCS.NS</a:t>
+                      </a:r>
+                    </a:p>
+                  </a:txBody>
+                  <a:tcPr/>
+                </a:tc>
+                <a:tc>
+                  <a:txBody>
+                    <a:bodyPr/>
+                    <a:lstStyle/>
+                    <a:p>
+                      <a:r>
+                        <a:t>IT</a:t>
+                      </a:r>
+                    </a:p>
+                  </a:txBody>
+                  <a:tcPr/>
+                </a:tc>
+                <a:tc>
+                  <a:txBody>
+                    <a:bodyPr/>
+                    <a:lstStyle/>
+                    <a:p>
+                      <a:r>
+                        <a:t>India</a:t>
+                      </a:r>
+                    </a:p>
+                  </a:txBody>
+                  <a:tcPr/>
+                </a:tc>
+                <a:tc>
+                  <a:txBody>
+                    <a:bodyPr/>
+                    <a:lstStyle/>
+                    <a:p>
+                      <a:r>
+                        <a:t>10000</a:t>
                       </a:r>
                     </a:p>
                   </a:txBody>

</xml_diff>

<commit_message>
Add the border line and some customization in the ppt to look professional
</commit_message>
<xml_diff>
--- a/examples/demo_PPT/output_demo.pptx
+++ b/examples/demo_PPT/output_demo.pptx
@@ -3140,48 +3140,76 @@
                     <a:bodyPr/>
                     <a:lstStyle/>
                     <a:p>
+                      <a:pPr algn="ctr">
+                        <a:defRPr b="1" sz="1200"/>
+                      </a:pPr>
                       <a:r>
                         <a:t>Asset</a:t>
                       </a:r>
                     </a:p>
                   </a:txBody>
-                  <a:tcPr/>
+                  <a:tcPr>
+                    <a:solidFill>
+                      <a:srgbClr val="C8C8C8"/>
+                    </a:solidFill>
+                  </a:tcPr>
                 </a:tc>
                 <a:tc>
                   <a:txBody>
                     <a:bodyPr/>
                     <a:lstStyle/>
                     <a:p>
+                      <a:pPr algn="ctr">
+                        <a:defRPr b="1" sz="1200"/>
+                      </a:pPr>
                       <a:r>
                         <a:t>Sector</a:t>
                       </a:r>
                     </a:p>
                   </a:txBody>
-                  <a:tcPr/>
+                  <a:tcPr>
+                    <a:solidFill>
+                      <a:srgbClr val="C8C8C8"/>
+                    </a:solidFill>
+                  </a:tcPr>
                 </a:tc>
                 <a:tc>
                   <a:txBody>
                     <a:bodyPr/>
                     <a:lstStyle/>
                     <a:p>
+                      <a:pPr algn="ctr">
+                        <a:defRPr b="1" sz="1200"/>
+                      </a:pPr>
                       <a:r>
                         <a:t>Country</a:t>
                       </a:r>
                     </a:p>
                   </a:txBody>
-                  <a:tcPr/>
+                  <a:tcPr>
+                    <a:solidFill>
+                      <a:srgbClr val="C8C8C8"/>
+                    </a:solidFill>
+                  </a:tcPr>
                 </a:tc>
                 <a:tc>
                   <a:txBody>
                     <a:bodyPr/>
                     <a:lstStyle/>
                     <a:p>
+                      <a:pPr algn="ctr">
+                        <a:defRPr b="1" sz="1200"/>
+                      </a:pPr>
                       <a:r>
                         <a:t>Value</a:t>
                       </a:r>
                     </a:p>
                   </a:txBody>
-                  <a:tcPr/>
+                  <a:tcPr>
+                    <a:solidFill>
+                      <a:srgbClr val="C8C8C8"/>
+                    </a:solidFill>
+                  </a:tcPr>
                 </a:tc>
               </a:tr>
               <a:tr h="609600">
@@ -3190,6 +3218,9 @@
                     <a:bodyPr/>
                     <a:lstStyle/>
                     <a:p>
+                      <a:pPr algn="l">
+                        <a:defRPr sz="1100"/>
+                      </a:pPr>
                       <a:r>
                         <a:t>AAPL</a:t>
                       </a:r>
@@ -3202,6 +3233,9 @@
                     <a:bodyPr/>
                     <a:lstStyle/>
                     <a:p>
+                      <a:pPr algn="l">
+                        <a:defRPr sz="1100"/>
+                      </a:pPr>
                       <a:r>
                         <a:t>Tech</a:t>
                       </a:r>
@@ -3214,6 +3248,9 @@
                     <a:bodyPr/>
                     <a:lstStyle/>
                     <a:p>
+                      <a:pPr algn="l">
+                        <a:defRPr sz="1100"/>
+                      </a:pPr>
                       <a:r>
                         <a:t>USA</a:t>
                       </a:r>
@@ -3226,6 +3263,9 @@
                     <a:bodyPr/>
                     <a:lstStyle/>
                     <a:p>
+                      <a:pPr algn="l">
+                        <a:defRPr sz="1100"/>
+                      </a:pPr>
                       <a:r>
                         <a:t>20000</a:t>
                       </a:r>
@@ -3240,6 +3280,9 @@
                     <a:bodyPr/>
                     <a:lstStyle/>
                     <a:p>
+                      <a:pPr algn="l">
+                        <a:defRPr sz="1100"/>
+                      </a:pPr>
                       <a:r>
                         <a:t>TSLA</a:t>
                       </a:r>
@@ -3252,6 +3295,9 @@
                     <a:bodyPr/>
                     <a:lstStyle/>
                     <a:p>
+                      <a:pPr algn="l">
+                        <a:defRPr sz="1100"/>
+                      </a:pPr>
                       <a:r>
                         <a:t>Auto</a:t>
                       </a:r>
@@ -3264,6 +3310,9 @@
                     <a:bodyPr/>
                     <a:lstStyle/>
                     <a:p>
+                      <a:pPr algn="l">
+                        <a:defRPr sz="1100"/>
+                      </a:pPr>
                       <a:r>
                         <a:t>USA</a:t>
                       </a:r>
@@ -3276,6 +3325,9 @@
                     <a:bodyPr/>
                     <a:lstStyle/>
                     <a:p>
+                      <a:pPr algn="l">
+                        <a:defRPr sz="1100"/>
+                      </a:pPr>
                       <a:r>
                         <a:t>15000</a:t>
                       </a:r>
@@ -3290,6 +3342,9 @@
                     <a:bodyPr/>
                     <a:lstStyle/>
                     <a:p>
+                      <a:pPr algn="l">
+                        <a:defRPr sz="1100"/>
+                      </a:pPr>
                       <a:r>
                         <a:t>TCS.NS</a:t>
                       </a:r>
@@ -3302,6 +3357,9 @@
                     <a:bodyPr/>
                     <a:lstStyle/>
                     <a:p>
+                      <a:pPr algn="l">
+                        <a:defRPr sz="1100"/>
+                      </a:pPr>
                       <a:r>
                         <a:t>IT</a:t>
                       </a:r>
@@ -3314,6 +3372,9 @@
                     <a:bodyPr/>
                     <a:lstStyle/>
                     <a:p>
+                      <a:pPr algn="l">
+                        <a:defRPr sz="1100"/>
+                      </a:pPr>
                       <a:r>
                         <a:t>India</a:t>
                       </a:r>
@@ -3326,6 +3387,9 @@
                     <a:bodyPr/>
                     <a:lstStyle/>
                     <a:p>
+                      <a:pPr algn="l">
+                        <a:defRPr sz="1100"/>
+                      </a:pPr>
                       <a:r>
                         <a:t>10000</a:t>
                       </a:r>
@@ -3340,6 +3404,9 @@
                     <a:bodyPr/>
                     <a:lstStyle/>
                     <a:p>
+                      <a:pPr algn="l">
+                        <a:defRPr sz="1100"/>
+                      </a:pPr>
                       <a:r>
                         <a:t>BTC-USD</a:t>
                       </a:r>
@@ -3352,6 +3419,9 @@
                     <a:bodyPr/>
                     <a:lstStyle/>
                     <a:p>
+                      <a:pPr algn="l">
+                        <a:defRPr sz="1100"/>
+                      </a:pPr>
                       <a:r>
                         <a:t>Crypto</a:t>
                       </a:r>
@@ -3364,6 +3434,9 @@
                     <a:bodyPr/>
                     <a:lstStyle/>
                     <a:p>
+                      <a:pPr algn="l">
+                        <a:defRPr sz="1100"/>
+                      </a:pPr>
                       <a:r>
                         <a:t>Global</a:t>
                       </a:r>
@@ -3376,6 +3449,9 @@
                     <a:bodyPr/>
                     <a:lstStyle/>
                     <a:p>
+                      <a:pPr algn="l">
+                        <a:defRPr sz="1100"/>
+                      </a:pPr>
                       <a:r>
                         <a:t>8000</a:t>
                       </a:r>
@@ -3390,6 +3466,9 @@
                     <a:bodyPr/>
                     <a:lstStyle/>
                     <a:p>
+                      <a:pPr algn="l">
+                        <a:defRPr sz="1100"/>
+                      </a:pPr>
                       <a:r>
                         <a:t>ETH-USD</a:t>
                       </a:r>
@@ -3402,6 +3481,9 @@
                     <a:bodyPr/>
                     <a:lstStyle/>
                     <a:p>
+                      <a:pPr algn="l">
+                        <a:defRPr sz="1100"/>
+                      </a:pPr>
                       <a:r>
                         <a:t>Crypto</a:t>
                       </a:r>
@@ -3414,6 +3496,9 @@
                     <a:bodyPr/>
                     <a:lstStyle/>
                     <a:p>
+                      <a:pPr algn="l">
+                        <a:defRPr sz="1100"/>
+                      </a:pPr>
                       <a:r>
                         <a:t>Global</a:t>
                       </a:r>
@@ -3426,6 +3511,9 @@
                     <a:bodyPr/>
                     <a:lstStyle/>
                     <a:p>
+                      <a:pPr algn="l">
+                        <a:defRPr sz="1100"/>
+                      </a:pPr>
                       <a:r>
                         <a:t>5000</a:t>
                       </a:r>
@@ -3507,48 +3595,76 @@
                     <a:bodyPr/>
                     <a:lstStyle/>
                     <a:p>
+                      <a:pPr algn="ctr">
+                        <a:defRPr b="1" sz="1200"/>
+                      </a:pPr>
                       <a:r>
                         <a:t>Asset</a:t>
                       </a:r>
                     </a:p>
                   </a:txBody>
-                  <a:tcPr/>
+                  <a:tcPr>
+                    <a:solidFill>
+                      <a:srgbClr val="C8C8C8"/>
+                    </a:solidFill>
+                  </a:tcPr>
                 </a:tc>
                 <a:tc>
                   <a:txBody>
                     <a:bodyPr/>
                     <a:lstStyle/>
                     <a:p>
+                      <a:pPr algn="ctr">
+                        <a:defRPr b="1" sz="1200"/>
+                      </a:pPr>
                       <a:r>
                         <a:t>Sector</a:t>
                       </a:r>
                     </a:p>
                   </a:txBody>
-                  <a:tcPr/>
+                  <a:tcPr>
+                    <a:solidFill>
+                      <a:srgbClr val="C8C8C8"/>
+                    </a:solidFill>
+                  </a:tcPr>
                 </a:tc>
                 <a:tc>
                   <a:txBody>
                     <a:bodyPr/>
                     <a:lstStyle/>
                     <a:p>
+                      <a:pPr algn="ctr">
+                        <a:defRPr b="1" sz="1200"/>
+                      </a:pPr>
                       <a:r>
                         <a:t>Country</a:t>
                       </a:r>
                     </a:p>
                   </a:txBody>
-                  <a:tcPr/>
+                  <a:tcPr>
+                    <a:solidFill>
+                      <a:srgbClr val="C8C8C8"/>
+                    </a:solidFill>
+                  </a:tcPr>
                 </a:tc>
                 <a:tc>
                   <a:txBody>
                     <a:bodyPr/>
                     <a:lstStyle/>
                     <a:p>
+                      <a:pPr algn="ctr">
+                        <a:defRPr b="1" sz="1200"/>
+                      </a:pPr>
                       <a:r>
                         <a:t>Value</a:t>
                       </a:r>
                     </a:p>
                   </a:txBody>
-                  <a:tcPr/>
+                  <a:tcPr>
+                    <a:solidFill>
+                      <a:srgbClr val="C8C8C8"/>
+                    </a:solidFill>
+                  </a:tcPr>
                 </a:tc>
               </a:tr>
               <a:tr h="914400">
@@ -3557,6 +3673,9 @@
                     <a:bodyPr/>
                     <a:lstStyle/>
                     <a:p>
+                      <a:pPr algn="l">
+                        <a:defRPr sz="1100"/>
+                      </a:pPr>
                       <a:r>
                         <a:t>AAPL</a:t>
                       </a:r>
@@ -3569,6 +3688,9 @@
                     <a:bodyPr/>
                     <a:lstStyle/>
                     <a:p>
+                      <a:pPr algn="l">
+                        <a:defRPr sz="1100"/>
+                      </a:pPr>
                       <a:r>
                         <a:t>Tech</a:t>
                       </a:r>
@@ -3581,6 +3703,9 @@
                     <a:bodyPr/>
                     <a:lstStyle/>
                     <a:p>
+                      <a:pPr algn="l">
+                        <a:defRPr sz="1100"/>
+                      </a:pPr>
                       <a:r>
                         <a:t>USA</a:t>
                       </a:r>
@@ -3593,6 +3718,9 @@
                     <a:bodyPr/>
                     <a:lstStyle/>
                     <a:p>
+                      <a:pPr algn="l">
+                        <a:defRPr sz="1100"/>
+                      </a:pPr>
                       <a:r>
                         <a:t>20000</a:t>
                       </a:r>
@@ -3607,6 +3735,9 @@
                     <a:bodyPr/>
                     <a:lstStyle/>
                     <a:p>
+                      <a:pPr algn="l">
+                        <a:defRPr sz="1100"/>
+                      </a:pPr>
                       <a:r>
                         <a:t>TSLA</a:t>
                       </a:r>
@@ -3619,6 +3750,9 @@
                     <a:bodyPr/>
                     <a:lstStyle/>
                     <a:p>
+                      <a:pPr algn="l">
+                        <a:defRPr sz="1100"/>
+                      </a:pPr>
                       <a:r>
                         <a:t>Auto</a:t>
                       </a:r>
@@ -3631,6 +3765,9 @@
                     <a:bodyPr/>
                     <a:lstStyle/>
                     <a:p>
+                      <a:pPr algn="l">
+                        <a:defRPr sz="1100"/>
+                      </a:pPr>
                       <a:r>
                         <a:t>USA</a:t>
                       </a:r>
@@ -3643,6 +3780,9 @@
                     <a:bodyPr/>
                     <a:lstStyle/>
                     <a:p>
+                      <a:pPr algn="l">
+                        <a:defRPr sz="1100"/>
+                      </a:pPr>
                       <a:r>
                         <a:t>15000</a:t>
                       </a:r>
@@ -3657,6 +3797,9 @@
                     <a:bodyPr/>
                     <a:lstStyle/>
                     <a:p>
+                      <a:pPr algn="l">
+                        <a:defRPr sz="1100"/>
+                      </a:pPr>
                       <a:r>
                         <a:t>TCS.NS</a:t>
                       </a:r>
@@ -3669,6 +3812,9 @@
                     <a:bodyPr/>
                     <a:lstStyle/>
                     <a:p>
+                      <a:pPr algn="l">
+                        <a:defRPr sz="1100"/>
+                      </a:pPr>
                       <a:r>
                         <a:t>IT</a:t>
                       </a:r>
@@ -3681,6 +3827,9 @@
                     <a:bodyPr/>
                     <a:lstStyle/>
                     <a:p>
+                      <a:pPr algn="l">
+                        <a:defRPr sz="1100"/>
+                      </a:pPr>
                       <a:r>
                         <a:t>India</a:t>
                       </a:r>
@@ -3693,6 +3842,9 @@
                     <a:bodyPr/>
                     <a:lstStyle/>
                     <a:p>
+                      <a:pPr algn="l">
+                        <a:defRPr sz="1100"/>
+                      </a:pPr>
                       <a:r>
                         <a:t>10000</a:t>
                       </a:r>

</xml_diff>

<commit_message>
Well Added More colour for better look and also create a pipleline for the user to select the formate of the ppt for now there is just one and other is a fallback which is basic but in future there will be more as also fix a single slide bug
</commit_message>
<xml_diff>
--- a/examples/demo_PPT/output_demo.pptx
+++ b/examples/demo_PPT/output_demo.pptx
@@ -3120,7 +3120,7 @@
         </p:nvGraphicFramePr>
         <p:xfrm>
           <a:off x="457200" y="1371600"/>
-          <a:ext cx="8229600" cy="3657600"/>
+          <a:ext cx="8229600" cy="4572000"/>
         </p:xfrm>
         <a:graphic>
           <a:graphicData uri="http://schemas.openxmlformats.org/drawingml/2006/table">
@@ -3129,28 +3129,31 @@
                 <a:tableStyleId>{5C22544A-7EE6-4342-B048-85BDC9FD1C3A}</a:tableStyleId>
               </a:tblPr>
               <a:tblGrid>
-                <a:gridCol w="2057400"/>
-                <a:gridCol w="2057400"/>
-                <a:gridCol w="2057400"/>
-                <a:gridCol w="2057400"/>
+                <a:gridCol w="2304288"/>
+                <a:gridCol w="1975104"/>
+                <a:gridCol w="2304288"/>
+                <a:gridCol w="1645920"/>
               </a:tblGrid>
-              <a:tr h="609600">
+              <a:tr h="762000">
                 <a:tc>
                   <a:txBody>
                     <a:bodyPr/>
                     <a:lstStyle/>
                     <a:p>
-                      <a:pPr algn="ctr">
-                        <a:defRPr b="1" sz="1200"/>
-                      </a:pPr>
+                      <a:pPr algn="ctr"/>
                       <a:r>
+                        <a:rPr b="1" sz="1200">
+                          <a:solidFill>
+                            <a:srgbClr val="FFFFFF"/>
+                          </a:solidFill>
+                        </a:rPr>
                         <a:t>Asset</a:t>
                       </a:r>
                     </a:p>
                   </a:txBody>
                   <a:tcPr>
                     <a:solidFill>
-                      <a:srgbClr val="C8C8C8"/>
+                      <a:srgbClr val="003366"/>
                     </a:solidFill>
                   </a:tcPr>
                 </a:tc>
@@ -3159,17 +3162,20 @@
                     <a:bodyPr/>
                     <a:lstStyle/>
                     <a:p>
-                      <a:pPr algn="ctr">
-                        <a:defRPr b="1" sz="1200"/>
-                      </a:pPr>
+                      <a:pPr algn="ctr"/>
                       <a:r>
+                        <a:rPr b="1" sz="1200">
+                          <a:solidFill>
+                            <a:srgbClr val="FFFFFF"/>
+                          </a:solidFill>
+                        </a:rPr>
                         <a:t>Sector</a:t>
                       </a:r>
                     </a:p>
                   </a:txBody>
                   <a:tcPr>
                     <a:solidFill>
-                      <a:srgbClr val="C8C8C8"/>
+                      <a:srgbClr val="003366"/>
                     </a:solidFill>
                   </a:tcPr>
                 </a:tc>
@@ -3178,17 +3184,20 @@
                     <a:bodyPr/>
                     <a:lstStyle/>
                     <a:p>
-                      <a:pPr algn="ctr">
-                        <a:defRPr b="1" sz="1200"/>
-                      </a:pPr>
+                      <a:pPr algn="ctr"/>
                       <a:r>
+                        <a:rPr b="1" sz="1200">
+                          <a:solidFill>
+                            <a:srgbClr val="FFFFFF"/>
+                          </a:solidFill>
+                        </a:rPr>
                         <a:t>Country</a:t>
                       </a:r>
                     </a:p>
                   </a:txBody>
                   <a:tcPr>
                     <a:solidFill>
-                      <a:srgbClr val="C8C8C8"/>
+                      <a:srgbClr val="003366"/>
                     </a:solidFill>
                   </a:tcPr>
                 </a:tc>
@@ -3197,329 +3206,392 @@
                     <a:bodyPr/>
                     <a:lstStyle/>
                     <a:p>
-                      <a:pPr algn="ctr">
-                        <a:defRPr b="1" sz="1200"/>
-                      </a:pPr>
+                      <a:pPr algn="ctr"/>
                       <a:r>
+                        <a:rPr b="1" sz="1200">
+                          <a:solidFill>
+                            <a:srgbClr val="FFFFFF"/>
+                          </a:solidFill>
+                        </a:rPr>
                         <a:t>Value</a:t>
                       </a:r>
                     </a:p>
                   </a:txBody>
                   <a:tcPr>
                     <a:solidFill>
-                      <a:srgbClr val="C8C8C8"/>
+                      <a:srgbClr val="003366"/>
                     </a:solidFill>
                   </a:tcPr>
                 </a:tc>
               </a:tr>
-              <a:tr h="609600">
+              <a:tr h="762000">
                 <a:tc>
                   <a:txBody>
                     <a:bodyPr/>
                     <a:lstStyle/>
                     <a:p>
-                      <a:pPr algn="l">
-                        <a:defRPr sz="1100"/>
-                      </a:pPr>
+                      <a:pPr algn="l"/>
                       <a:r>
+                        <a:rPr b="0" sz="1100"/>
                         <a:t>AAPL</a:t>
                       </a:r>
                     </a:p>
                   </a:txBody>
-                  <a:tcPr/>
+                  <a:tcPr>
+                    <a:solidFill>
+                      <a:srgbClr val="EBF1DE"/>
+                    </a:solidFill>
+                  </a:tcPr>
                 </a:tc>
                 <a:tc>
                   <a:txBody>
                     <a:bodyPr/>
                     <a:lstStyle/>
                     <a:p>
-                      <a:pPr algn="l">
-                        <a:defRPr sz="1100"/>
-                      </a:pPr>
+                      <a:pPr algn="l"/>
                       <a:r>
+                        <a:rPr b="0" sz="1100"/>
                         <a:t>Tech</a:t>
                       </a:r>
                     </a:p>
                   </a:txBody>
-                  <a:tcPr/>
+                  <a:tcPr>
+                    <a:solidFill>
+                      <a:srgbClr val="EBF1DE"/>
+                    </a:solidFill>
+                  </a:tcPr>
                 </a:tc>
                 <a:tc>
                   <a:txBody>
                     <a:bodyPr/>
                     <a:lstStyle/>
                     <a:p>
-                      <a:pPr algn="l">
-                        <a:defRPr sz="1100"/>
-                      </a:pPr>
+                      <a:pPr algn="l"/>
                       <a:r>
+                        <a:rPr b="0" sz="1100"/>
                         <a:t>USA</a:t>
                       </a:r>
                     </a:p>
                   </a:txBody>
-                  <a:tcPr/>
+                  <a:tcPr>
+                    <a:solidFill>
+                      <a:srgbClr val="EBF1DE"/>
+                    </a:solidFill>
+                  </a:tcPr>
                 </a:tc>
                 <a:tc>
                   <a:txBody>
                     <a:bodyPr/>
                     <a:lstStyle/>
                     <a:p>
-                      <a:pPr algn="l">
-                        <a:defRPr sz="1100"/>
-                      </a:pPr>
+                      <a:pPr algn="r"/>
                       <a:r>
+                        <a:rPr b="0" sz="1100"/>
                         <a:t>20000</a:t>
                       </a:r>
                     </a:p>
                   </a:txBody>
-                  <a:tcPr/>
+                  <a:tcPr>
+                    <a:solidFill>
+                      <a:srgbClr val="EBF1DE"/>
+                    </a:solidFill>
+                  </a:tcPr>
                 </a:tc>
               </a:tr>
-              <a:tr h="609600">
+              <a:tr h="762000">
                 <a:tc>
                   <a:txBody>
                     <a:bodyPr/>
                     <a:lstStyle/>
                     <a:p>
-                      <a:pPr algn="l">
-                        <a:defRPr sz="1100"/>
-                      </a:pPr>
+                      <a:pPr algn="l"/>
                       <a:r>
+                        <a:rPr b="0" sz="1100"/>
                         <a:t>TSLA</a:t>
                       </a:r>
                     </a:p>
                   </a:txBody>
-                  <a:tcPr/>
+                  <a:tcPr>
+                    <a:solidFill>
+                      <a:srgbClr val="FFFFFF"/>
+                    </a:solidFill>
+                  </a:tcPr>
                 </a:tc>
                 <a:tc>
                   <a:txBody>
                     <a:bodyPr/>
                     <a:lstStyle/>
                     <a:p>
-                      <a:pPr algn="l">
-                        <a:defRPr sz="1100"/>
-                      </a:pPr>
+                      <a:pPr algn="l"/>
                       <a:r>
+                        <a:rPr b="0" sz="1100"/>
                         <a:t>Auto</a:t>
                       </a:r>
                     </a:p>
                   </a:txBody>
-                  <a:tcPr/>
+                  <a:tcPr>
+                    <a:solidFill>
+                      <a:srgbClr val="FFFFFF"/>
+                    </a:solidFill>
+                  </a:tcPr>
                 </a:tc>
                 <a:tc>
                   <a:txBody>
                     <a:bodyPr/>
                     <a:lstStyle/>
                     <a:p>
-                      <a:pPr algn="l">
-                        <a:defRPr sz="1100"/>
-                      </a:pPr>
+                      <a:pPr algn="l"/>
                       <a:r>
+                        <a:rPr b="0" sz="1100"/>
                         <a:t>USA</a:t>
                       </a:r>
                     </a:p>
                   </a:txBody>
-                  <a:tcPr/>
+                  <a:tcPr>
+                    <a:solidFill>
+                      <a:srgbClr val="FFFFFF"/>
+                    </a:solidFill>
+                  </a:tcPr>
                 </a:tc>
                 <a:tc>
                   <a:txBody>
                     <a:bodyPr/>
                     <a:lstStyle/>
                     <a:p>
-                      <a:pPr algn="l">
-                        <a:defRPr sz="1100"/>
-                      </a:pPr>
+                      <a:pPr algn="r"/>
                       <a:r>
+                        <a:rPr b="0" sz="1100"/>
                         <a:t>15000</a:t>
                       </a:r>
                     </a:p>
                   </a:txBody>
-                  <a:tcPr/>
+                  <a:tcPr>
+                    <a:solidFill>
+                      <a:srgbClr val="FFFFFF"/>
+                    </a:solidFill>
+                  </a:tcPr>
                 </a:tc>
               </a:tr>
-              <a:tr h="609600">
+              <a:tr h="762000">
                 <a:tc>
                   <a:txBody>
                     <a:bodyPr/>
                     <a:lstStyle/>
                     <a:p>
-                      <a:pPr algn="l">
-                        <a:defRPr sz="1100"/>
-                      </a:pPr>
+                      <a:pPr algn="l"/>
                       <a:r>
+                        <a:rPr b="0" sz="1100"/>
                         <a:t>TCS.NS</a:t>
                       </a:r>
                     </a:p>
                   </a:txBody>
-                  <a:tcPr/>
+                  <a:tcPr>
+                    <a:solidFill>
+                      <a:srgbClr val="EBF1DE"/>
+                    </a:solidFill>
+                  </a:tcPr>
                 </a:tc>
                 <a:tc>
                   <a:txBody>
                     <a:bodyPr/>
                     <a:lstStyle/>
                     <a:p>
-                      <a:pPr algn="l">
-                        <a:defRPr sz="1100"/>
-                      </a:pPr>
+                      <a:pPr algn="l"/>
                       <a:r>
+                        <a:rPr b="0" sz="1100"/>
                         <a:t>IT</a:t>
                       </a:r>
                     </a:p>
                   </a:txBody>
-                  <a:tcPr/>
+                  <a:tcPr>
+                    <a:solidFill>
+                      <a:srgbClr val="EBF1DE"/>
+                    </a:solidFill>
+                  </a:tcPr>
                 </a:tc>
                 <a:tc>
                   <a:txBody>
                     <a:bodyPr/>
                     <a:lstStyle/>
                     <a:p>
-                      <a:pPr algn="l">
-                        <a:defRPr sz="1100"/>
-                      </a:pPr>
+                      <a:pPr algn="l"/>
                       <a:r>
+                        <a:rPr b="0" sz="1100"/>
                         <a:t>India</a:t>
                       </a:r>
                     </a:p>
                   </a:txBody>
-                  <a:tcPr/>
+                  <a:tcPr>
+                    <a:solidFill>
+                      <a:srgbClr val="EBF1DE"/>
+                    </a:solidFill>
+                  </a:tcPr>
                 </a:tc>
                 <a:tc>
                   <a:txBody>
                     <a:bodyPr/>
                     <a:lstStyle/>
                     <a:p>
-                      <a:pPr algn="l">
-                        <a:defRPr sz="1100"/>
-                      </a:pPr>
+                      <a:pPr algn="r"/>
                       <a:r>
+                        <a:rPr b="0" sz="1100"/>
                         <a:t>10000</a:t>
                       </a:r>
                     </a:p>
                   </a:txBody>
-                  <a:tcPr/>
+                  <a:tcPr>
+                    <a:solidFill>
+                      <a:srgbClr val="EBF1DE"/>
+                    </a:solidFill>
+                  </a:tcPr>
                 </a:tc>
               </a:tr>
-              <a:tr h="609600">
+              <a:tr h="762000">
                 <a:tc>
                   <a:txBody>
                     <a:bodyPr/>
                     <a:lstStyle/>
                     <a:p>
-                      <a:pPr algn="l">
-                        <a:defRPr sz="1100"/>
-                      </a:pPr>
+                      <a:pPr algn="l"/>
                       <a:r>
+                        <a:rPr b="0" sz="1100"/>
                         <a:t>BTC-USD</a:t>
                       </a:r>
                     </a:p>
                   </a:txBody>
-                  <a:tcPr/>
+                  <a:tcPr>
+                    <a:solidFill>
+                      <a:srgbClr val="FFFFFF"/>
+                    </a:solidFill>
+                  </a:tcPr>
                 </a:tc>
                 <a:tc>
                   <a:txBody>
                     <a:bodyPr/>
                     <a:lstStyle/>
                     <a:p>
-                      <a:pPr algn="l">
-                        <a:defRPr sz="1100"/>
-                      </a:pPr>
+                      <a:pPr algn="l"/>
                       <a:r>
+                        <a:rPr b="0" sz="1100"/>
                         <a:t>Crypto</a:t>
                       </a:r>
                     </a:p>
                   </a:txBody>
-                  <a:tcPr/>
+                  <a:tcPr>
+                    <a:solidFill>
+                      <a:srgbClr val="FFFFFF"/>
+                    </a:solidFill>
+                  </a:tcPr>
                 </a:tc>
                 <a:tc>
                   <a:txBody>
                     <a:bodyPr/>
                     <a:lstStyle/>
                     <a:p>
-                      <a:pPr algn="l">
-                        <a:defRPr sz="1100"/>
-                      </a:pPr>
+                      <a:pPr algn="l"/>
                       <a:r>
+                        <a:rPr b="0" sz="1100"/>
                         <a:t>Global</a:t>
                       </a:r>
                     </a:p>
                   </a:txBody>
-                  <a:tcPr/>
+                  <a:tcPr>
+                    <a:solidFill>
+                      <a:srgbClr val="FFFFFF"/>
+                    </a:solidFill>
+                  </a:tcPr>
                 </a:tc>
                 <a:tc>
                   <a:txBody>
                     <a:bodyPr/>
                     <a:lstStyle/>
                     <a:p>
-                      <a:pPr algn="l">
-                        <a:defRPr sz="1100"/>
-                      </a:pPr>
+                      <a:pPr algn="r"/>
                       <a:r>
+                        <a:rPr b="0" sz="1100"/>
                         <a:t>8000</a:t>
                       </a:r>
                     </a:p>
                   </a:txBody>
-                  <a:tcPr/>
+                  <a:tcPr>
+                    <a:solidFill>
+                      <a:srgbClr val="FFFFFF"/>
+                    </a:solidFill>
+                  </a:tcPr>
                 </a:tc>
               </a:tr>
-              <a:tr h="609600">
+              <a:tr h="762000">
                 <a:tc>
                   <a:txBody>
                     <a:bodyPr/>
                     <a:lstStyle/>
                     <a:p>
-                      <a:pPr algn="l">
-                        <a:defRPr sz="1100"/>
-                      </a:pPr>
+                      <a:pPr algn="l"/>
                       <a:r>
+                        <a:rPr b="0" sz="1100"/>
                         <a:t>ETH-USD</a:t>
                       </a:r>
                     </a:p>
                   </a:txBody>
-                  <a:tcPr/>
+                  <a:tcPr>
+                    <a:solidFill>
+                      <a:srgbClr val="EBF1DE"/>
+                    </a:solidFill>
+                  </a:tcPr>
                 </a:tc>
                 <a:tc>
                   <a:txBody>
                     <a:bodyPr/>
                     <a:lstStyle/>
                     <a:p>
-                      <a:pPr algn="l">
-                        <a:defRPr sz="1100"/>
-                      </a:pPr>
+                      <a:pPr algn="l"/>
                       <a:r>
+                        <a:rPr b="0" sz="1100"/>
                         <a:t>Crypto</a:t>
                       </a:r>
                     </a:p>
                   </a:txBody>
-                  <a:tcPr/>
+                  <a:tcPr>
+                    <a:solidFill>
+                      <a:srgbClr val="EBF1DE"/>
+                    </a:solidFill>
+                  </a:tcPr>
                 </a:tc>
                 <a:tc>
                   <a:txBody>
                     <a:bodyPr/>
                     <a:lstStyle/>
                     <a:p>
-                      <a:pPr algn="l">
-                        <a:defRPr sz="1100"/>
-                      </a:pPr>
+                      <a:pPr algn="l"/>
                       <a:r>
+                        <a:rPr b="0" sz="1100"/>
                         <a:t>Global</a:t>
                       </a:r>
                     </a:p>
                   </a:txBody>
-                  <a:tcPr/>
+                  <a:tcPr>
+                    <a:solidFill>
+                      <a:srgbClr val="EBF1DE"/>
+                    </a:solidFill>
+                  </a:tcPr>
                 </a:tc>
                 <a:tc>
                   <a:txBody>
                     <a:bodyPr/>
                     <a:lstStyle/>
                     <a:p>
-                      <a:pPr algn="l">
-                        <a:defRPr sz="1100"/>
-                      </a:pPr>
+                      <a:pPr algn="r"/>
                       <a:r>
+                        <a:rPr b="0" sz="1100"/>
                         <a:t>5000</a:t>
                       </a:r>
                     </a:p>
                   </a:txBody>
-                  <a:tcPr/>
+                  <a:tcPr>
+                    <a:solidFill>
+                      <a:srgbClr val="EBF1DE"/>
+                    </a:solidFill>
+                  </a:tcPr>
                 </a:tc>
               </a:tr>
             </a:tbl>
@@ -3575,7 +3647,7 @@
         </p:nvGraphicFramePr>
         <p:xfrm>
           <a:off x="457200" y="1371600"/>
-          <a:ext cx="8229600" cy="3657600"/>
+          <a:ext cx="8229600" cy="4572000"/>
         </p:xfrm>
         <a:graphic>
           <a:graphicData uri="http://schemas.openxmlformats.org/drawingml/2006/table">
@@ -3586,26 +3658,29 @@
               <a:tblGrid>
                 <a:gridCol w="2057400"/>
                 <a:gridCol w="2057400"/>
-                <a:gridCol w="2057400"/>
-                <a:gridCol w="2057400"/>
+                <a:gridCol w="2400300"/>
+                <a:gridCol w="1714500"/>
               </a:tblGrid>
-              <a:tr h="914400">
+              <a:tr h="1143000">
                 <a:tc>
                   <a:txBody>
                     <a:bodyPr/>
                     <a:lstStyle/>
                     <a:p>
-                      <a:pPr algn="ctr">
-                        <a:defRPr b="1" sz="1200"/>
-                      </a:pPr>
+                      <a:pPr algn="ctr"/>
                       <a:r>
+                        <a:rPr b="1" sz="1200">
+                          <a:solidFill>
+                            <a:srgbClr val="FFFFFF"/>
+                          </a:solidFill>
+                        </a:rPr>
                         <a:t>Asset</a:t>
                       </a:r>
                     </a:p>
                   </a:txBody>
                   <a:tcPr>
                     <a:solidFill>
-                      <a:srgbClr val="C8C8C8"/>
+                      <a:srgbClr val="003366"/>
                     </a:solidFill>
                   </a:tcPr>
                 </a:tc>
@@ -3614,17 +3689,20 @@
                     <a:bodyPr/>
                     <a:lstStyle/>
                     <a:p>
-                      <a:pPr algn="ctr">
-                        <a:defRPr b="1" sz="1200"/>
-                      </a:pPr>
+                      <a:pPr algn="ctr"/>
                       <a:r>
+                        <a:rPr b="1" sz="1200">
+                          <a:solidFill>
+                            <a:srgbClr val="FFFFFF"/>
+                          </a:solidFill>
+                        </a:rPr>
                         <a:t>Sector</a:t>
                       </a:r>
                     </a:p>
                   </a:txBody>
                   <a:tcPr>
                     <a:solidFill>
-                      <a:srgbClr val="C8C8C8"/>
+                      <a:srgbClr val="003366"/>
                     </a:solidFill>
                   </a:tcPr>
                 </a:tc>
@@ -3633,17 +3711,20 @@
                     <a:bodyPr/>
                     <a:lstStyle/>
                     <a:p>
-                      <a:pPr algn="ctr">
-                        <a:defRPr b="1" sz="1200"/>
-                      </a:pPr>
+                      <a:pPr algn="ctr"/>
                       <a:r>
+                        <a:rPr b="1" sz="1200">
+                          <a:solidFill>
+                            <a:srgbClr val="FFFFFF"/>
+                          </a:solidFill>
+                        </a:rPr>
                         <a:t>Country</a:t>
                       </a:r>
                     </a:p>
                   </a:txBody>
                   <a:tcPr>
                     <a:solidFill>
-                      <a:srgbClr val="C8C8C8"/>
+                      <a:srgbClr val="003366"/>
                     </a:solidFill>
                   </a:tcPr>
                 </a:tc>
@@ -3652,205 +3733,244 @@
                     <a:bodyPr/>
                     <a:lstStyle/>
                     <a:p>
-                      <a:pPr algn="ctr">
-                        <a:defRPr b="1" sz="1200"/>
-                      </a:pPr>
+                      <a:pPr algn="ctr"/>
                       <a:r>
+                        <a:rPr b="1" sz="1200">
+                          <a:solidFill>
+                            <a:srgbClr val="FFFFFF"/>
+                          </a:solidFill>
+                        </a:rPr>
                         <a:t>Value</a:t>
                       </a:r>
                     </a:p>
                   </a:txBody>
                   <a:tcPr>
                     <a:solidFill>
-                      <a:srgbClr val="C8C8C8"/>
+                      <a:srgbClr val="003366"/>
                     </a:solidFill>
                   </a:tcPr>
                 </a:tc>
               </a:tr>
-              <a:tr h="914400">
+              <a:tr h="1143000">
                 <a:tc>
                   <a:txBody>
                     <a:bodyPr/>
                     <a:lstStyle/>
                     <a:p>
-                      <a:pPr algn="l">
-                        <a:defRPr sz="1100"/>
-                      </a:pPr>
+                      <a:pPr algn="l"/>
                       <a:r>
+                        <a:rPr b="0" sz="1100"/>
                         <a:t>AAPL</a:t>
                       </a:r>
                     </a:p>
                   </a:txBody>
-                  <a:tcPr/>
+                  <a:tcPr>
+                    <a:solidFill>
+                      <a:srgbClr val="EBF1DE"/>
+                    </a:solidFill>
+                  </a:tcPr>
                 </a:tc>
                 <a:tc>
                   <a:txBody>
                     <a:bodyPr/>
                     <a:lstStyle/>
                     <a:p>
-                      <a:pPr algn="l">
-                        <a:defRPr sz="1100"/>
-                      </a:pPr>
+                      <a:pPr algn="l"/>
                       <a:r>
+                        <a:rPr b="0" sz="1100"/>
                         <a:t>Tech</a:t>
                       </a:r>
                     </a:p>
                   </a:txBody>
-                  <a:tcPr/>
+                  <a:tcPr>
+                    <a:solidFill>
+                      <a:srgbClr val="EBF1DE"/>
+                    </a:solidFill>
+                  </a:tcPr>
                 </a:tc>
                 <a:tc>
                   <a:txBody>
                     <a:bodyPr/>
                     <a:lstStyle/>
                     <a:p>
-                      <a:pPr algn="l">
-                        <a:defRPr sz="1100"/>
-                      </a:pPr>
+                      <a:pPr algn="l"/>
                       <a:r>
+                        <a:rPr b="0" sz="1100"/>
                         <a:t>USA</a:t>
                       </a:r>
                     </a:p>
                   </a:txBody>
-                  <a:tcPr/>
+                  <a:tcPr>
+                    <a:solidFill>
+                      <a:srgbClr val="EBF1DE"/>
+                    </a:solidFill>
+                  </a:tcPr>
                 </a:tc>
                 <a:tc>
                   <a:txBody>
                     <a:bodyPr/>
                     <a:lstStyle/>
                     <a:p>
-                      <a:pPr algn="l">
-                        <a:defRPr sz="1100"/>
-                      </a:pPr>
+                      <a:pPr algn="r"/>
                       <a:r>
+                        <a:rPr b="0" sz="1100"/>
                         <a:t>20000</a:t>
                       </a:r>
                     </a:p>
                   </a:txBody>
-                  <a:tcPr/>
+                  <a:tcPr>
+                    <a:solidFill>
+                      <a:srgbClr val="EBF1DE"/>
+                    </a:solidFill>
+                  </a:tcPr>
                 </a:tc>
               </a:tr>
-              <a:tr h="914400">
+              <a:tr h="1143000">
                 <a:tc>
                   <a:txBody>
                     <a:bodyPr/>
                     <a:lstStyle/>
                     <a:p>
-                      <a:pPr algn="l">
-                        <a:defRPr sz="1100"/>
-                      </a:pPr>
+                      <a:pPr algn="l"/>
                       <a:r>
+                        <a:rPr b="0" sz="1100"/>
                         <a:t>TSLA</a:t>
                       </a:r>
                     </a:p>
                   </a:txBody>
-                  <a:tcPr/>
+                  <a:tcPr>
+                    <a:solidFill>
+                      <a:srgbClr val="FFFFFF"/>
+                    </a:solidFill>
+                  </a:tcPr>
                 </a:tc>
                 <a:tc>
                   <a:txBody>
                     <a:bodyPr/>
                     <a:lstStyle/>
                     <a:p>
-                      <a:pPr algn="l">
-                        <a:defRPr sz="1100"/>
-                      </a:pPr>
+                      <a:pPr algn="l"/>
                       <a:r>
+                        <a:rPr b="0" sz="1100"/>
                         <a:t>Auto</a:t>
                       </a:r>
                     </a:p>
                   </a:txBody>
-                  <a:tcPr/>
+                  <a:tcPr>
+                    <a:solidFill>
+                      <a:srgbClr val="FFFFFF"/>
+                    </a:solidFill>
+                  </a:tcPr>
                 </a:tc>
                 <a:tc>
                   <a:txBody>
                     <a:bodyPr/>
                     <a:lstStyle/>
                     <a:p>
-                      <a:pPr algn="l">
-                        <a:defRPr sz="1100"/>
-                      </a:pPr>
+                      <a:pPr algn="l"/>
                       <a:r>
+                        <a:rPr b="0" sz="1100"/>
                         <a:t>USA</a:t>
                       </a:r>
                     </a:p>
                   </a:txBody>
-                  <a:tcPr/>
+                  <a:tcPr>
+                    <a:solidFill>
+                      <a:srgbClr val="FFFFFF"/>
+                    </a:solidFill>
+                  </a:tcPr>
                 </a:tc>
                 <a:tc>
                   <a:txBody>
                     <a:bodyPr/>
                     <a:lstStyle/>
                     <a:p>
-                      <a:pPr algn="l">
-                        <a:defRPr sz="1100"/>
-                      </a:pPr>
+                      <a:pPr algn="r"/>
                       <a:r>
+                        <a:rPr b="0" sz="1100"/>
                         <a:t>15000</a:t>
                       </a:r>
                     </a:p>
                   </a:txBody>
-                  <a:tcPr/>
+                  <a:tcPr>
+                    <a:solidFill>
+                      <a:srgbClr val="FFFFFF"/>
+                    </a:solidFill>
+                  </a:tcPr>
                 </a:tc>
               </a:tr>
-              <a:tr h="914400">
+              <a:tr h="1143000">
                 <a:tc>
                   <a:txBody>
                     <a:bodyPr/>
                     <a:lstStyle/>
                     <a:p>
-                      <a:pPr algn="l">
-                        <a:defRPr sz="1100"/>
-                      </a:pPr>
+                      <a:pPr algn="l"/>
                       <a:r>
+                        <a:rPr b="0" sz="1100"/>
                         <a:t>TCS.NS</a:t>
                       </a:r>
                     </a:p>
                   </a:txBody>
-                  <a:tcPr/>
+                  <a:tcPr>
+                    <a:solidFill>
+                      <a:srgbClr val="EBF1DE"/>
+                    </a:solidFill>
+                  </a:tcPr>
                 </a:tc>
                 <a:tc>
                   <a:txBody>
                     <a:bodyPr/>
                     <a:lstStyle/>
                     <a:p>
-                      <a:pPr algn="l">
-                        <a:defRPr sz="1100"/>
-                      </a:pPr>
+                      <a:pPr algn="l"/>
                       <a:r>
+                        <a:rPr b="0" sz="1100"/>
                         <a:t>IT</a:t>
                       </a:r>
                     </a:p>
                   </a:txBody>
-                  <a:tcPr/>
+                  <a:tcPr>
+                    <a:solidFill>
+                      <a:srgbClr val="EBF1DE"/>
+                    </a:solidFill>
+                  </a:tcPr>
                 </a:tc>
                 <a:tc>
                   <a:txBody>
                     <a:bodyPr/>
                     <a:lstStyle/>
                     <a:p>
-                      <a:pPr algn="l">
-                        <a:defRPr sz="1100"/>
-                      </a:pPr>
+                      <a:pPr algn="l"/>
                       <a:r>
+                        <a:rPr b="0" sz="1100"/>
                         <a:t>India</a:t>
                       </a:r>
                     </a:p>
                   </a:txBody>
-                  <a:tcPr/>
+                  <a:tcPr>
+                    <a:solidFill>
+                      <a:srgbClr val="EBF1DE"/>
+                    </a:solidFill>
+                  </a:tcPr>
                 </a:tc>
                 <a:tc>
                   <a:txBody>
                     <a:bodyPr/>
                     <a:lstStyle/>
                     <a:p>
-                      <a:pPr algn="l">
-                        <a:defRPr sz="1100"/>
-                      </a:pPr>
+                      <a:pPr algn="r"/>
                       <a:r>
+                        <a:rPr b="0" sz="1100"/>
                         <a:t>10000</a:t>
                       </a:r>
                     </a:p>
                   </a:txBody>
-                  <a:tcPr/>
+                  <a:tcPr>
+                    <a:solidFill>
+                      <a:srgbClr val="EBF1DE"/>
+                    </a:solidFill>
+                  </a:tcPr>
                 </a:tc>
               </a:tr>
             </a:tbl>

</xml_diff>

<commit_message>
There is an glitch in summary pipleine so it creates an empty ppt sometimes solve that tomorrow
</commit_message>
<xml_diff>
--- a/examples/demo_PPT/output_demo.pptx
+++ b/examples/demo_PPT/output_demo.pptx
@@ -3110,494 +3110,6 @@
           </a:p>
         </p:txBody>
       </p:sp>
-      <p:graphicFrame>
-        <p:nvGraphicFramePr>
-          <p:cNvPr id="3" name="Table 2"/>
-          <p:cNvGraphicFramePr>
-            <a:graphicFrameLocks noGrp="1"/>
-          </p:cNvGraphicFramePr>
-          <p:nvPr/>
-        </p:nvGraphicFramePr>
-        <p:xfrm>
-          <a:off x="457200" y="1371600"/>
-          <a:ext cx="8229600" cy="4572000"/>
-        </p:xfrm>
-        <a:graphic>
-          <a:graphicData uri="http://schemas.openxmlformats.org/drawingml/2006/table">
-            <a:tbl>
-              <a:tblPr firstRow="1" bandRow="1">
-                <a:tableStyleId>{5C22544A-7EE6-4342-B048-85BDC9FD1C3A}</a:tableStyleId>
-              </a:tblPr>
-              <a:tblGrid>
-                <a:gridCol w="2304288"/>
-                <a:gridCol w="1975104"/>
-                <a:gridCol w="2304288"/>
-                <a:gridCol w="1645920"/>
-              </a:tblGrid>
-              <a:tr h="762000">
-                <a:tc>
-                  <a:txBody>
-                    <a:bodyPr/>
-                    <a:lstStyle/>
-                    <a:p>
-                      <a:pPr algn="ctr"/>
-                      <a:r>
-                        <a:rPr b="1" sz="1200">
-                          <a:solidFill>
-                            <a:srgbClr val="FFFFFF"/>
-                          </a:solidFill>
-                        </a:rPr>
-                        <a:t>Asset</a:t>
-                      </a:r>
-                    </a:p>
-                  </a:txBody>
-                  <a:tcPr>
-                    <a:solidFill>
-                      <a:srgbClr val="003366"/>
-                    </a:solidFill>
-                  </a:tcPr>
-                </a:tc>
-                <a:tc>
-                  <a:txBody>
-                    <a:bodyPr/>
-                    <a:lstStyle/>
-                    <a:p>
-                      <a:pPr algn="ctr"/>
-                      <a:r>
-                        <a:rPr b="1" sz="1200">
-                          <a:solidFill>
-                            <a:srgbClr val="FFFFFF"/>
-                          </a:solidFill>
-                        </a:rPr>
-                        <a:t>Sector</a:t>
-                      </a:r>
-                    </a:p>
-                  </a:txBody>
-                  <a:tcPr>
-                    <a:solidFill>
-                      <a:srgbClr val="003366"/>
-                    </a:solidFill>
-                  </a:tcPr>
-                </a:tc>
-                <a:tc>
-                  <a:txBody>
-                    <a:bodyPr/>
-                    <a:lstStyle/>
-                    <a:p>
-                      <a:pPr algn="ctr"/>
-                      <a:r>
-                        <a:rPr b="1" sz="1200">
-                          <a:solidFill>
-                            <a:srgbClr val="FFFFFF"/>
-                          </a:solidFill>
-                        </a:rPr>
-                        <a:t>Country</a:t>
-                      </a:r>
-                    </a:p>
-                  </a:txBody>
-                  <a:tcPr>
-                    <a:solidFill>
-                      <a:srgbClr val="003366"/>
-                    </a:solidFill>
-                  </a:tcPr>
-                </a:tc>
-                <a:tc>
-                  <a:txBody>
-                    <a:bodyPr/>
-                    <a:lstStyle/>
-                    <a:p>
-                      <a:pPr algn="ctr"/>
-                      <a:r>
-                        <a:rPr b="1" sz="1200">
-                          <a:solidFill>
-                            <a:srgbClr val="FFFFFF"/>
-                          </a:solidFill>
-                        </a:rPr>
-                        <a:t>Value</a:t>
-                      </a:r>
-                    </a:p>
-                  </a:txBody>
-                  <a:tcPr>
-                    <a:solidFill>
-                      <a:srgbClr val="003366"/>
-                    </a:solidFill>
-                  </a:tcPr>
-                </a:tc>
-              </a:tr>
-              <a:tr h="762000">
-                <a:tc>
-                  <a:txBody>
-                    <a:bodyPr/>
-                    <a:lstStyle/>
-                    <a:p>
-                      <a:pPr algn="l"/>
-                      <a:r>
-                        <a:rPr b="0" sz="1100"/>
-                        <a:t>AAPL</a:t>
-                      </a:r>
-                    </a:p>
-                  </a:txBody>
-                  <a:tcPr>
-                    <a:solidFill>
-                      <a:srgbClr val="EBF1DE"/>
-                    </a:solidFill>
-                  </a:tcPr>
-                </a:tc>
-                <a:tc>
-                  <a:txBody>
-                    <a:bodyPr/>
-                    <a:lstStyle/>
-                    <a:p>
-                      <a:pPr algn="l"/>
-                      <a:r>
-                        <a:rPr b="0" sz="1100"/>
-                        <a:t>Tech</a:t>
-                      </a:r>
-                    </a:p>
-                  </a:txBody>
-                  <a:tcPr>
-                    <a:solidFill>
-                      <a:srgbClr val="EBF1DE"/>
-                    </a:solidFill>
-                  </a:tcPr>
-                </a:tc>
-                <a:tc>
-                  <a:txBody>
-                    <a:bodyPr/>
-                    <a:lstStyle/>
-                    <a:p>
-                      <a:pPr algn="l"/>
-                      <a:r>
-                        <a:rPr b="0" sz="1100"/>
-                        <a:t>USA</a:t>
-                      </a:r>
-                    </a:p>
-                  </a:txBody>
-                  <a:tcPr>
-                    <a:solidFill>
-                      <a:srgbClr val="EBF1DE"/>
-                    </a:solidFill>
-                  </a:tcPr>
-                </a:tc>
-                <a:tc>
-                  <a:txBody>
-                    <a:bodyPr/>
-                    <a:lstStyle/>
-                    <a:p>
-                      <a:pPr algn="r"/>
-                      <a:r>
-                        <a:rPr b="0" sz="1100"/>
-                        <a:t>20000</a:t>
-                      </a:r>
-                    </a:p>
-                  </a:txBody>
-                  <a:tcPr>
-                    <a:solidFill>
-                      <a:srgbClr val="EBF1DE"/>
-                    </a:solidFill>
-                  </a:tcPr>
-                </a:tc>
-              </a:tr>
-              <a:tr h="762000">
-                <a:tc>
-                  <a:txBody>
-                    <a:bodyPr/>
-                    <a:lstStyle/>
-                    <a:p>
-                      <a:pPr algn="l"/>
-                      <a:r>
-                        <a:rPr b="0" sz="1100"/>
-                        <a:t>TSLA</a:t>
-                      </a:r>
-                    </a:p>
-                  </a:txBody>
-                  <a:tcPr>
-                    <a:solidFill>
-                      <a:srgbClr val="FFFFFF"/>
-                    </a:solidFill>
-                  </a:tcPr>
-                </a:tc>
-                <a:tc>
-                  <a:txBody>
-                    <a:bodyPr/>
-                    <a:lstStyle/>
-                    <a:p>
-                      <a:pPr algn="l"/>
-                      <a:r>
-                        <a:rPr b="0" sz="1100"/>
-                        <a:t>Auto</a:t>
-                      </a:r>
-                    </a:p>
-                  </a:txBody>
-                  <a:tcPr>
-                    <a:solidFill>
-                      <a:srgbClr val="FFFFFF"/>
-                    </a:solidFill>
-                  </a:tcPr>
-                </a:tc>
-                <a:tc>
-                  <a:txBody>
-                    <a:bodyPr/>
-                    <a:lstStyle/>
-                    <a:p>
-                      <a:pPr algn="l"/>
-                      <a:r>
-                        <a:rPr b="0" sz="1100"/>
-                        <a:t>USA</a:t>
-                      </a:r>
-                    </a:p>
-                  </a:txBody>
-                  <a:tcPr>
-                    <a:solidFill>
-                      <a:srgbClr val="FFFFFF"/>
-                    </a:solidFill>
-                  </a:tcPr>
-                </a:tc>
-                <a:tc>
-                  <a:txBody>
-                    <a:bodyPr/>
-                    <a:lstStyle/>
-                    <a:p>
-                      <a:pPr algn="r"/>
-                      <a:r>
-                        <a:rPr b="0" sz="1100"/>
-                        <a:t>15000</a:t>
-                      </a:r>
-                    </a:p>
-                  </a:txBody>
-                  <a:tcPr>
-                    <a:solidFill>
-                      <a:srgbClr val="FFFFFF"/>
-                    </a:solidFill>
-                  </a:tcPr>
-                </a:tc>
-              </a:tr>
-              <a:tr h="762000">
-                <a:tc>
-                  <a:txBody>
-                    <a:bodyPr/>
-                    <a:lstStyle/>
-                    <a:p>
-                      <a:pPr algn="l"/>
-                      <a:r>
-                        <a:rPr b="0" sz="1100"/>
-                        <a:t>TCS.NS</a:t>
-                      </a:r>
-                    </a:p>
-                  </a:txBody>
-                  <a:tcPr>
-                    <a:solidFill>
-                      <a:srgbClr val="EBF1DE"/>
-                    </a:solidFill>
-                  </a:tcPr>
-                </a:tc>
-                <a:tc>
-                  <a:txBody>
-                    <a:bodyPr/>
-                    <a:lstStyle/>
-                    <a:p>
-                      <a:pPr algn="l"/>
-                      <a:r>
-                        <a:rPr b="0" sz="1100"/>
-                        <a:t>IT</a:t>
-                      </a:r>
-                    </a:p>
-                  </a:txBody>
-                  <a:tcPr>
-                    <a:solidFill>
-                      <a:srgbClr val="EBF1DE"/>
-                    </a:solidFill>
-                  </a:tcPr>
-                </a:tc>
-                <a:tc>
-                  <a:txBody>
-                    <a:bodyPr/>
-                    <a:lstStyle/>
-                    <a:p>
-                      <a:pPr algn="l"/>
-                      <a:r>
-                        <a:rPr b="0" sz="1100"/>
-                        <a:t>India</a:t>
-                      </a:r>
-                    </a:p>
-                  </a:txBody>
-                  <a:tcPr>
-                    <a:solidFill>
-                      <a:srgbClr val="EBF1DE"/>
-                    </a:solidFill>
-                  </a:tcPr>
-                </a:tc>
-                <a:tc>
-                  <a:txBody>
-                    <a:bodyPr/>
-                    <a:lstStyle/>
-                    <a:p>
-                      <a:pPr algn="r"/>
-                      <a:r>
-                        <a:rPr b="0" sz="1100"/>
-                        <a:t>10000</a:t>
-                      </a:r>
-                    </a:p>
-                  </a:txBody>
-                  <a:tcPr>
-                    <a:solidFill>
-                      <a:srgbClr val="EBF1DE"/>
-                    </a:solidFill>
-                  </a:tcPr>
-                </a:tc>
-              </a:tr>
-              <a:tr h="762000">
-                <a:tc>
-                  <a:txBody>
-                    <a:bodyPr/>
-                    <a:lstStyle/>
-                    <a:p>
-                      <a:pPr algn="l"/>
-                      <a:r>
-                        <a:rPr b="0" sz="1100"/>
-                        <a:t>BTC-USD</a:t>
-                      </a:r>
-                    </a:p>
-                  </a:txBody>
-                  <a:tcPr>
-                    <a:solidFill>
-                      <a:srgbClr val="FFFFFF"/>
-                    </a:solidFill>
-                  </a:tcPr>
-                </a:tc>
-                <a:tc>
-                  <a:txBody>
-                    <a:bodyPr/>
-                    <a:lstStyle/>
-                    <a:p>
-                      <a:pPr algn="l"/>
-                      <a:r>
-                        <a:rPr b="0" sz="1100"/>
-                        <a:t>Crypto</a:t>
-                      </a:r>
-                    </a:p>
-                  </a:txBody>
-                  <a:tcPr>
-                    <a:solidFill>
-                      <a:srgbClr val="FFFFFF"/>
-                    </a:solidFill>
-                  </a:tcPr>
-                </a:tc>
-                <a:tc>
-                  <a:txBody>
-                    <a:bodyPr/>
-                    <a:lstStyle/>
-                    <a:p>
-                      <a:pPr algn="l"/>
-                      <a:r>
-                        <a:rPr b="0" sz="1100"/>
-                        <a:t>Global</a:t>
-                      </a:r>
-                    </a:p>
-                  </a:txBody>
-                  <a:tcPr>
-                    <a:solidFill>
-                      <a:srgbClr val="FFFFFF"/>
-                    </a:solidFill>
-                  </a:tcPr>
-                </a:tc>
-                <a:tc>
-                  <a:txBody>
-                    <a:bodyPr/>
-                    <a:lstStyle/>
-                    <a:p>
-                      <a:pPr algn="r"/>
-                      <a:r>
-                        <a:rPr b="0" sz="1100"/>
-                        <a:t>8000</a:t>
-                      </a:r>
-                    </a:p>
-                  </a:txBody>
-                  <a:tcPr>
-                    <a:solidFill>
-                      <a:srgbClr val="FFFFFF"/>
-                    </a:solidFill>
-                  </a:tcPr>
-                </a:tc>
-              </a:tr>
-              <a:tr h="762000">
-                <a:tc>
-                  <a:txBody>
-                    <a:bodyPr/>
-                    <a:lstStyle/>
-                    <a:p>
-                      <a:pPr algn="l"/>
-                      <a:r>
-                        <a:rPr b="0" sz="1100"/>
-                        <a:t>ETH-USD</a:t>
-                      </a:r>
-                    </a:p>
-                  </a:txBody>
-                  <a:tcPr>
-                    <a:solidFill>
-                      <a:srgbClr val="EBF1DE"/>
-                    </a:solidFill>
-                  </a:tcPr>
-                </a:tc>
-                <a:tc>
-                  <a:txBody>
-                    <a:bodyPr/>
-                    <a:lstStyle/>
-                    <a:p>
-                      <a:pPr algn="l"/>
-                      <a:r>
-                        <a:rPr b="0" sz="1100"/>
-                        <a:t>Crypto</a:t>
-                      </a:r>
-                    </a:p>
-                  </a:txBody>
-                  <a:tcPr>
-                    <a:solidFill>
-                      <a:srgbClr val="EBF1DE"/>
-                    </a:solidFill>
-                  </a:tcPr>
-                </a:tc>
-                <a:tc>
-                  <a:txBody>
-                    <a:bodyPr/>
-                    <a:lstStyle/>
-                    <a:p>
-                      <a:pPr algn="l"/>
-                      <a:r>
-                        <a:rPr b="0" sz="1100"/>
-                        <a:t>Global</a:t>
-                      </a:r>
-                    </a:p>
-                  </a:txBody>
-                  <a:tcPr>
-                    <a:solidFill>
-                      <a:srgbClr val="EBF1DE"/>
-                    </a:solidFill>
-                  </a:tcPr>
-                </a:tc>
-                <a:tc>
-                  <a:txBody>
-                    <a:bodyPr/>
-                    <a:lstStyle/>
-                    <a:p>
-                      <a:pPr algn="r"/>
-                      <a:r>
-                        <a:rPr b="0" sz="1100"/>
-                        <a:t>5000</a:t>
-                      </a:r>
-                    </a:p>
-                  </a:txBody>
-                  <a:tcPr>
-                    <a:solidFill>
-                      <a:srgbClr val="EBF1DE"/>
-                    </a:solidFill>
-                  </a:tcPr>
-                </a:tc>
-              </a:tr>
-            </a:tbl>
-          </a:graphicData>
-        </a:graphic>
-      </p:graphicFrame>
     </p:spTree>
   </p:cSld>
   <p:clrMapOvr>
@@ -3637,346 +3149,6 @@
           </a:p>
         </p:txBody>
       </p:sp>
-      <p:graphicFrame>
-        <p:nvGraphicFramePr>
-          <p:cNvPr id="3" name="Table 2"/>
-          <p:cNvGraphicFramePr>
-            <a:graphicFrameLocks noGrp="1"/>
-          </p:cNvGraphicFramePr>
-          <p:nvPr/>
-        </p:nvGraphicFramePr>
-        <p:xfrm>
-          <a:off x="457200" y="1371600"/>
-          <a:ext cx="8229600" cy="4572000"/>
-        </p:xfrm>
-        <a:graphic>
-          <a:graphicData uri="http://schemas.openxmlformats.org/drawingml/2006/table">
-            <a:tbl>
-              <a:tblPr firstRow="1" bandRow="1">
-                <a:tableStyleId>{5C22544A-7EE6-4342-B048-85BDC9FD1C3A}</a:tableStyleId>
-              </a:tblPr>
-              <a:tblGrid>
-                <a:gridCol w="2057400"/>
-                <a:gridCol w="2057400"/>
-                <a:gridCol w="2400300"/>
-                <a:gridCol w="1714500"/>
-              </a:tblGrid>
-              <a:tr h="1143000">
-                <a:tc>
-                  <a:txBody>
-                    <a:bodyPr/>
-                    <a:lstStyle/>
-                    <a:p>
-                      <a:pPr algn="ctr"/>
-                      <a:r>
-                        <a:rPr b="1" sz="1200">
-                          <a:solidFill>
-                            <a:srgbClr val="FFFFFF"/>
-                          </a:solidFill>
-                        </a:rPr>
-                        <a:t>Asset</a:t>
-                      </a:r>
-                    </a:p>
-                  </a:txBody>
-                  <a:tcPr>
-                    <a:solidFill>
-                      <a:srgbClr val="003366"/>
-                    </a:solidFill>
-                  </a:tcPr>
-                </a:tc>
-                <a:tc>
-                  <a:txBody>
-                    <a:bodyPr/>
-                    <a:lstStyle/>
-                    <a:p>
-                      <a:pPr algn="ctr"/>
-                      <a:r>
-                        <a:rPr b="1" sz="1200">
-                          <a:solidFill>
-                            <a:srgbClr val="FFFFFF"/>
-                          </a:solidFill>
-                        </a:rPr>
-                        <a:t>Sector</a:t>
-                      </a:r>
-                    </a:p>
-                  </a:txBody>
-                  <a:tcPr>
-                    <a:solidFill>
-                      <a:srgbClr val="003366"/>
-                    </a:solidFill>
-                  </a:tcPr>
-                </a:tc>
-                <a:tc>
-                  <a:txBody>
-                    <a:bodyPr/>
-                    <a:lstStyle/>
-                    <a:p>
-                      <a:pPr algn="ctr"/>
-                      <a:r>
-                        <a:rPr b="1" sz="1200">
-                          <a:solidFill>
-                            <a:srgbClr val="FFFFFF"/>
-                          </a:solidFill>
-                        </a:rPr>
-                        <a:t>Country</a:t>
-                      </a:r>
-                    </a:p>
-                  </a:txBody>
-                  <a:tcPr>
-                    <a:solidFill>
-                      <a:srgbClr val="003366"/>
-                    </a:solidFill>
-                  </a:tcPr>
-                </a:tc>
-                <a:tc>
-                  <a:txBody>
-                    <a:bodyPr/>
-                    <a:lstStyle/>
-                    <a:p>
-                      <a:pPr algn="ctr"/>
-                      <a:r>
-                        <a:rPr b="1" sz="1200">
-                          <a:solidFill>
-                            <a:srgbClr val="FFFFFF"/>
-                          </a:solidFill>
-                        </a:rPr>
-                        <a:t>Value</a:t>
-                      </a:r>
-                    </a:p>
-                  </a:txBody>
-                  <a:tcPr>
-                    <a:solidFill>
-                      <a:srgbClr val="003366"/>
-                    </a:solidFill>
-                  </a:tcPr>
-                </a:tc>
-              </a:tr>
-              <a:tr h="1143000">
-                <a:tc>
-                  <a:txBody>
-                    <a:bodyPr/>
-                    <a:lstStyle/>
-                    <a:p>
-                      <a:pPr algn="l"/>
-                      <a:r>
-                        <a:rPr b="0" sz="1100"/>
-                        <a:t>AAPL</a:t>
-                      </a:r>
-                    </a:p>
-                  </a:txBody>
-                  <a:tcPr>
-                    <a:solidFill>
-                      <a:srgbClr val="EBF1DE"/>
-                    </a:solidFill>
-                  </a:tcPr>
-                </a:tc>
-                <a:tc>
-                  <a:txBody>
-                    <a:bodyPr/>
-                    <a:lstStyle/>
-                    <a:p>
-                      <a:pPr algn="l"/>
-                      <a:r>
-                        <a:rPr b="0" sz="1100"/>
-                        <a:t>Tech</a:t>
-                      </a:r>
-                    </a:p>
-                  </a:txBody>
-                  <a:tcPr>
-                    <a:solidFill>
-                      <a:srgbClr val="EBF1DE"/>
-                    </a:solidFill>
-                  </a:tcPr>
-                </a:tc>
-                <a:tc>
-                  <a:txBody>
-                    <a:bodyPr/>
-                    <a:lstStyle/>
-                    <a:p>
-                      <a:pPr algn="l"/>
-                      <a:r>
-                        <a:rPr b="0" sz="1100"/>
-                        <a:t>USA</a:t>
-                      </a:r>
-                    </a:p>
-                  </a:txBody>
-                  <a:tcPr>
-                    <a:solidFill>
-                      <a:srgbClr val="EBF1DE"/>
-                    </a:solidFill>
-                  </a:tcPr>
-                </a:tc>
-                <a:tc>
-                  <a:txBody>
-                    <a:bodyPr/>
-                    <a:lstStyle/>
-                    <a:p>
-                      <a:pPr algn="r"/>
-                      <a:r>
-                        <a:rPr b="0" sz="1100"/>
-                        <a:t>20000</a:t>
-                      </a:r>
-                    </a:p>
-                  </a:txBody>
-                  <a:tcPr>
-                    <a:solidFill>
-                      <a:srgbClr val="EBF1DE"/>
-                    </a:solidFill>
-                  </a:tcPr>
-                </a:tc>
-              </a:tr>
-              <a:tr h="1143000">
-                <a:tc>
-                  <a:txBody>
-                    <a:bodyPr/>
-                    <a:lstStyle/>
-                    <a:p>
-                      <a:pPr algn="l"/>
-                      <a:r>
-                        <a:rPr b="0" sz="1100"/>
-                        <a:t>TSLA</a:t>
-                      </a:r>
-                    </a:p>
-                  </a:txBody>
-                  <a:tcPr>
-                    <a:solidFill>
-                      <a:srgbClr val="FFFFFF"/>
-                    </a:solidFill>
-                  </a:tcPr>
-                </a:tc>
-                <a:tc>
-                  <a:txBody>
-                    <a:bodyPr/>
-                    <a:lstStyle/>
-                    <a:p>
-                      <a:pPr algn="l"/>
-                      <a:r>
-                        <a:rPr b="0" sz="1100"/>
-                        <a:t>Auto</a:t>
-                      </a:r>
-                    </a:p>
-                  </a:txBody>
-                  <a:tcPr>
-                    <a:solidFill>
-                      <a:srgbClr val="FFFFFF"/>
-                    </a:solidFill>
-                  </a:tcPr>
-                </a:tc>
-                <a:tc>
-                  <a:txBody>
-                    <a:bodyPr/>
-                    <a:lstStyle/>
-                    <a:p>
-                      <a:pPr algn="l"/>
-                      <a:r>
-                        <a:rPr b="0" sz="1100"/>
-                        <a:t>USA</a:t>
-                      </a:r>
-                    </a:p>
-                  </a:txBody>
-                  <a:tcPr>
-                    <a:solidFill>
-                      <a:srgbClr val="FFFFFF"/>
-                    </a:solidFill>
-                  </a:tcPr>
-                </a:tc>
-                <a:tc>
-                  <a:txBody>
-                    <a:bodyPr/>
-                    <a:lstStyle/>
-                    <a:p>
-                      <a:pPr algn="r"/>
-                      <a:r>
-                        <a:rPr b="0" sz="1100"/>
-                        <a:t>15000</a:t>
-                      </a:r>
-                    </a:p>
-                  </a:txBody>
-                  <a:tcPr>
-                    <a:solidFill>
-                      <a:srgbClr val="FFFFFF"/>
-                    </a:solidFill>
-                  </a:tcPr>
-                </a:tc>
-              </a:tr>
-              <a:tr h="1143000">
-                <a:tc>
-                  <a:txBody>
-                    <a:bodyPr/>
-                    <a:lstStyle/>
-                    <a:p>
-                      <a:pPr algn="l"/>
-                      <a:r>
-                        <a:rPr b="0" sz="1100"/>
-                        <a:t>TCS.NS</a:t>
-                      </a:r>
-                    </a:p>
-                  </a:txBody>
-                  <a:tcPr>
-                    <a:solidFill>
-                      <a:srgbClr val="EBF1DE"/>
-                    </a:solidFill>
-                  </a:tcPr>
-                </a:tc>
-                <a:tc>
-                  <a:txBody>
-                    <a:bodyPr/>
-                    <a:lstStyle/>
-                    <a:p>
-                      <a:pPr algn="l"/>
-                      <a:r>
-                        <a:rPr b="0" sz="1100"/>
-                        <a:t>IT</a:t>
-                      </a:r>
-                    </a:p>
-                  </a:txBody>
-                  <a:tcPr>
-                    <a:solidFill>
-                      <a:srgbClr val="EBF1DE"/>
-                    </a:solidFill>
-                  </a:tcPr>
-                </a:tc>
-                <a:tc>
-                  <a:txBody>
-                    <a:bodyPr/>
-                    <a:lstStyle/>
-                    <a:p>
-                      <a:pPr algn="l"/>
-                      <a:r>
-                        <a:rPr b="0" sz="1100"/>
-                        <a:t>India</a:t>
-                      </a:r>
-                    </a:p>
-                  </a:txBody>
-                  <a:tcPr>
-                    <a:solidFill>
-                      <a:srgbClr val="EBF1DE"/>
-                    </a:solidFill>
-                  </a:tcPr>
-                </a:tc>
-                <a:tc>
-                  <a:txBody>
-                    <a:bodyPr/>
-                    <a:lstStyle/>
-                    <a:p>
-                      <a:pPr algn="r"/>
-                      <a:r>
-                        <a:rPr b="0" sz="1100"/>
-                        <a:t>10000</a:t>
-                      </a:r>
-                    </a:p>
-                  </a:txBody>
-                  <a:tcPr>
-                    <a:solidFill>
-                      <a:srgbClr val="EBF1DE"/>
-                    </a:solidFill>
-                  </a:tcPr>
-                </a:tc>
-              </a:tr>
-            </a:tbl>
-          </a:graphicData>
-        </a:graphic>
-      </p:graphicFrame>
     </p:spTree>
   </p:cSld>
   <p:clrMapOvr>

</xml_diff>

<commit_message>
Im fucked up Now need to rewrite everything from tommorow again or else this project is dommed
</commit_message>
<xml_diff>
--- a/examples/demo_PPT/output_demo.pptx
+++ b/examples/demo_PPT/output_demo.pptx
@@ -6,7 +6,6 @@
   </p:sldMasterIdLst>
   <p:sldIdLst>
     <p:sldId id="256" r:id="rId7"/>
-    <p:sldId id="257" r:id="rId8"/>
   </p:sldIdLst>
   <p:sldSz cx="9144000" cy="6858000" type="screen4x3"/>
   <p:notesSz cx="6858000" cy="9144000"/>
@@ -3110,45 +3109,200 @@
           </a:p>
         </p:txBody>
       </p:sp>
-    </p:spTree>
-  </p:cSld>
-  <p:clrMapOvr>
-    <a:masterClrMapping/>
-  </p:clrMapOvr>
-</p:sld>
-</file>
-
-<file path=ppt/slides/slide2.xml><?xml version="1.0" encoding="utf-8"?>
-<p:sld xmlns:a="http://schemas.openxmlformats.org/drawingml/2006/main" xmlns:p="http://schemas.openxmlformats.org/presentationml/2006/main" xmlns:r="http://schemas.openxmlformats.org/officeDocument/2006/relationships">
-  <p:cSld>
-    <p:spTree>
-      <p:nvGrpSpPr>
-        <p:cNvPr id="1" name=""/>
-        <p:cNvGrpSpPr/>
-        <p:nvPr/>
-      </p:nvGrpSpPr>
-      <p:grpSpPr/>
-      <p:sp>
-        <p:nvSpPr>
-          <p:cNvPr id="2" name="Title 1"/>
-          <p:cNvSpPr>
-            <a:spLocks noGrp="1"/>
-          </p:cNvSpPr>
-          <p:nvPr>
-            <p:ph type="title"/>
-          </p:nvPr>
-        </p:nvSpPr>
-        <p:spPr/>
-        <p:txBody>
-          <a:bodyPr/>
-          <a:lstStyle/>
-          <a:p>
-            <a:r>
-              <a:t> Top 3 Portfoilio Assests</a:t>
-            </a:r>
-          </a:p>
-        </p:txBody>
-      </p:sp>
+      <p:graphicFrame>
+        <p:nvGraphicFramePr>
+          <p:cNvPr id="3" name="Table 2"/>
+          <p:cNvGraphicFramePr>
+            <a:graphicFrameLocks noGrp="1"/>
+          </p:cNvGraphicFramePr>
+          <p:nvPr/>
+        </p:nvGraphicFramePr>
+        <p:xfrm>
+          <a:off x="457200" y="1371600"/>
+          <a:ext cx="8229599" cy="3657600"/>
+        </p:xfrm>
+        <a:graphic>
+          <a:graphicData uri="http://schemas.openxmlformats.org/drawingml/2006/table">
+            <a:tbl>
+              <a:tblPr firstRow="1" bandRow="1">
+                <a:tableStyleId>{5C22544A-7EE6-4342-B048-85BDC9FD1C3A}</a:tableStyleId>
+              </a:tblPr>
+              <a:tblGrid>
+                <a:gridCol w="5809129"/>
+                <a:gridCol w="2420470"/>
+              </a:tblGrid>
+              <a:tr h="731520">
+                <a:tc>
+                  <a:txBody>
+                    <a:bodyPr/>
+                    <a:lstStyle/>
+                    <a:p>
+                      <a:pPr algn="ctr">
+                        <a:defRPr b="1" sz="1200"/>
+                      </a:pPr>
+                      <a:r>
+                        <a:t>Metric</a:t>
+                      </a:r>
+                    </a:p>
+                  </a:txBody>
+                  <a:tcPr>
+                    <a:solidFill>
+                      <a:srgbClr val="C8C8C8"/>
+                    </a:solidFill>
+                  </a:tcPr>
+                </a:tc>
+                <a:tc>
+                  <a:txBody>
+                    <a:bodyPr/>
+                    <a:lstStyle/>
+                    <a:p>
+                      <a:pPr algn="ctr">
+                        <a:defRPr b="1" sz="1200"/>
+                      </a:pPr>
+                      <a:r>
+                        <a:t>Value</a:t>
+                      </a:r>
+                    </a:p>
+                  </a:txBody>
+                  <a:tcPr>
+                    <a:solidFill>
+                      <a:srgbClr val="C8C8C8"/>
+                    </a:solidFill>
+                  </a:tcPr>
+                </a:tc>
+              </a:tr>
+              <a:tr h="731520">
+                <a:tc>
+                  <a:txBody>
+                    <a:bodyPr/>
+                    <a:lstStyle/>
+                    <a:p>
+                      <a:pPr algn="l">
+                        <a:defRPr sz="1100"/>
+                      </a:pPr>
+                      <a:r>
+                        <a:t>Sharpe Ratio</a:t>
+                      </a:r>
+                    </a:p>
+                  </a:txBody>
+                  <a:tcPr/>
+                </a:tc>
+                <a:tc>
+                  <a:txBody>
+                    <a:bodyPr/>
+                    <a:lstStyle/>
+                    <a:p>
+                      <a:pPr algn="r">
+                        <a:defRPr sz="1100"/>
+                      </a:pPr>
+                      <a:r>
+                        <a:t>2.1</a:t>
+                      </a:r>
+                    </a:p>
+                  </a:txBody>
+                  <a:tcPr/>
+                </a:tc>
+              </a:tr>
+              <a:tr h="731520">
+                <a:tc>
+                  <a:txBody>
+                    <a:bodyPr/>
+                    <a:lstStyle/>
+                    <a:p>
+                      <a:pPr algn="l">
+                        <a:defRPr sz="1100"/>
+                      </a:pPr>
+                      <a:r>
+                        <a:t>Sortino</a:t>
+                      </a:r>
+                    </a:p>
+                  </a:txBody>
+                  <a:tcPr/>
+                </a:tc>
+                <a:tc>
+                  <a:txBody>
+                    <a:bodyPr/>
+                    <a:lstStyle/>
+                    <a:p>
+                      <a:pPr algn="r">
+                        <a:defRPr sz="1100"/>
+                      </a:pPr>
+                      <a:r>
+                        <a:t>1.8</a:t>
+                      </a:r>
+                    </a:p>
+                  </a:txBody>
+                  <a:tcPr/>
+                </a:tc>
+              </a:tr>
+              <a:tr h="731520">
+                <a:tc>
+                  <a:txBody>
+                    <a:bodyPr/>
+                    <a:lstStyle/>
+                    <a:p>
+                      <a:pPr algn="l">
+                        <a:defRPr sz="1100"/>
+                      </a:pPr>
+                      <a:r>
+                        <a:t>Max Drawdown</a:t>
+                      </a:r>
+                    </a:p>
+                  </a:txBody>
+                  <a:tcPr/>
+                </a:tc>
+                <a:tc>
+                  <a:txBody>
+                    <a:bodyPr/>
+                    <a:lstStyle/>
+                    <a:p>
+                      <a:pPr algn="r">
+                        <a:defRPr sz="1100"/>
+                      </a:pPr>
+                      <a:r>
+                        <a:t>0.18</a:t>
+                      </a:r>
+                    </a:p>
+                  </a:txBody>
+                  <a:tcPr/>
+                </a:tc>
+              </a:tr>
+              <a:tr h="731520">
+                <a:tc>
+                  <a:txBody>
+                    <a:bodyPr/>
+                    <a:lstStyle/>
+                    <a:p>
+                      <a:pPr algn="l">
+                        <a:defRPr sz="1100"/>
+                      </a:pPr>
+                      <a:r>
+                        <a:t>Beta</a:t>
+                      </a:r>
+                    </a:p>
+                  </a:txBody>
+                  <a:tcPr/>
+                </a:tc>
+                <a:tc>
+                  <a:txBody>
+                    <a:bodyPr/>
+                    <a:lstStyle/>
+                    <a:p>
+                      <a:pPr algn="r">
+                        <a:defRPr sz="1100"/>
+                      </a:pPr>
+                      <a:r>
+                        <a:t>1.05</a:t>
+                      </a:r>
+                    </a:p>
+                  </a:txBody>
+                  <a:tcPr/>
+                </a:tc>
+              </a:tr>
+            </a:tbl>
+          </a:graphicData>
+        </a:graphic>
+      </p:graphicFrame>
     </p:spTree>
   </p:cSld>
   <p:clrMapOvr>

</xml_diff>